<commit_message>
Se corrige error en el título de la presentación y se deja versión en pdf
</commit_message>
<xml_diff>
--- a/2018/201811-ValidacionEstructuraYContenido.pptx
+++ b/2018/201811-ValidacionEstructuraYContenido.pptx
@@ -729,15 +729,7 @@
             </a:pPr>
             <a:r>
               <a:rPr lang="es-CL" sz="1100" baseline="0" noProof="0" dirty="0"/>
-              <a:t>3. ¿Está esta lista lo suficientemente completa para </a:t>
-            </a:r>
-            <a:r>
-              <a:rPr lang="es-CL" sz="1100" baseline="0" noProof="0" dirty="0" err="1"/>
-              <a:t>uds.</a:t>
-            </a:r>
-            <a:r>
-              <a:rPr lang="es-CL" sz="1100" baseline="0" noProof="0" dirty="0"/>
-              <a:t>?</a:t>
+              <a:t>3. ¿Está esta lista lo suficientemente completa para uds.?</a:t>
             </a:r>
           </a:p>
           <a:p>
@@ -779,7 +771,7 @@
               <a:pPr/>
               <a:t>1</a:t>
             </a:fld>
-            <a:endParaRPr lang="en-US">
+            <a:endParaRPr lang="en-US" dirty="0">
               <a:solidFill>
                 <a:prstClr val="black"/>
               </a:solidFill>
@@ -1021,15 +1013,7 @@
             </a:pPr>
             <a:r>
               <a:rPr lang="es-CL" sz="1100" baseline="0" noProof="0" dirty="0"/>
-              <a:t>3. ¿Está esta lista lo suficientemente completa para </a:t>
-            </a:r>
-            <a:r>
-              <a:rPr lang="es-CL" sz="1100" baseline="0" noProof="0" dirty="0" err="1"/>
-              <a:t>uds.</a:t>
-            </a:r>
-            <a:r>
-              <a:rPr lang="es-CL" sz="1100" baseline="0" noProof="0" dirty="0"/>
-              <a:t>?</a:t>
+              <a:t>3. ¿Está esta lista lo suficientemente completa para uds.?</a:t>
             </a:r>
           </a:p>
           <a:p>
@@ -1071,7 +1055,7 @@
               <a:pPr/>
               <a:t>2</a:t>
             </a:fld>
-            <a:endParaRPr lang="en-US">
+            <a:endParaRPr lang="en-US" dirty="0">
               <a:solidFill>
                 <a:prstClr val="black"/>
               </a:solidFill>
@@ -1313,15 +1297,7 @@
             </a:pPr>
             <a:r>
               <a:rPr lang="es-CL" sz="1100" baseline="0" noProof="0" dirty="0"/>
-              <a:t>3. ¿Está esta lista lo suficientemente completa para </a:t>
-            </a:r>
-            <a:r>
-              <a:rPr lang="es-CL" sz="1100" baseline="0" noProof="0" dirty="0" err="1"/>
-              <a:t>uds.</a:t>
-            </a:r>
-            <a:r>
-              <a:rPr lang="es-CL" sz="1100" baseline="0" noProof="0" dirty="0"/>
-              <a:t>?</a:t>
+              <a:t>3. ¿Está esta lista lo suficientemente completa para uds.?</a:t>
             </a:r>
           </a:p>
           <a:p>
@@ -1363,7 +1339,7 @@
               <a:pPr/>
               <a:t>3</a:t>
             </a:fld>
-            <a:endParaRPr lang="en-US">
+            <a:endParaRPr lang="en-US" dirty="0">
               <a:solidFill>
                 <a:prstClr val="black"/>
               </a:solidFill>
@@ -1605,15 +1581,7 @@
             </a:pPr>
             <a:r>
               <a:rPr lang="es-CL" sz="1100" baseline="0" noProof="0" dirty="0"/>
-              <a:t>3. ¿Está esta lista lo suficientemente completa para </a:t>
-            </a:r>
-            <a:r>
-              <a:rPr lang="es-CL" sz="1100" baseline="0" noProof="0" dirty="0" err="1"/>
-              <a:t>uds.</a:t>
-            </a:r>
-            <a:r>
-              <a:rPr lang="es-CL" sz="1100" baseline="0" noProof="0" dirty="0"/>
-              <a:t>?</a:t>
+              <a:t>3. ¿Está esta lista lo suficientemente completa para uds.?</a:t>
             </a:r>
           </a:p>
           <a:p>
@@ -1655,7 +1623,7 @@
               <a:pPr/>
               <a:t>4</a:t>
             </a:fld>
-            <a:endParaRPr lang="en-US">
+            <a:endParaRPr lang="en-US" dirty="0">
               <a:solidFill>
                 <a:prstClr val="black"/>
               </a:solidFill>
@@ -1897,15 +1865,7 @@
             </a:pPr>
             <a:r>
               <a:rPr lang="es-CL" sz="1100" baseline="0" noProof="0" dirty="0"/>
-              <a:t>3. ¿Está esta lista lo suficientemente completa para </a:t>
-            </a:r>
-            <a:r>
-              <a:rPr lang="es-CL" sz="1100" baseline="0" noProof="0" dirty="0" err="1"/>
-              <a:t>uds.</a:t>
-            </a:r>
-            <a:r>
-              <a:rPr lang="es-CL" sz="1100" baseline="0" noProof="0" dirty="0"/>
-              <a:t>?</a:t>
+              <a:t>3. ¿Está esta lista lo suficientemente completa para uds.?</a:t>
             </a:r>
           </a:p>
           <a:p>
@@ -1947,7 +1907,7 @@
               <a:pPr/>
               <a:t>5</a:t>
             </a:fld>
-            <a:endParaRPr lang="en-US">
+            <a:endParaRPr lang="en-US" dirty="0">
               <a:solidFill>
                 <a:prstClr val="black"/>
               </a:solidFill>
@@ -2189,15 +2149,7 @@
             </a:pPr>
             <a:r>
               <a:rPr lang="es-CL" sz="1100" baseline="0" noProof="0" dirty="0"/>
-              <a:t>3. ¿Está esta lista lo suficientemente completa para </a:t>
-            </a:r>
-            <a:r>
-              <a:rPr lang="es-CL" sz="1100" baseline="0" noProof="0" dirty="0" err="1"/>
-              <a:t>uds.</a:t>
-            </a:r>
-            <a:r>
-              <a:rPr lang="es-CL" sz="1100" baseline="0" noProof="0" dirty="0"/>
-              <a:t>?</a:t>
+              <a:t>3. ¿Está esta lista lo suficientemente completa para uds.?</a:t>
             </a:r>
           </a:p>
           <a:p>
@@ -2239,7 +2191,7 @@
               <a:pPr/>
               <a:t>6</a:t>
             </a:fld>
-            <a:endParaRPr lang="en-US">
+            <a:endParaRPr lang="en-US" dirty="0">
               <a:solidFill>
                 <a:prstClr val="black"/>
               </a:solidFill>
@@ -8521,7 +8473,7 @@
                 <a:ea typeface="Roboto" panose="02000000000000000000" pitchFamily="2" charset="0"/>
                 <a:cs typeface="Roboto" panose="02000000000000000000" pitchFamily="2" charset="0"/>
               </a:rPr>
-              <a:t>Manuel de Buenas Prácticas para el Desarrollo de Proyectos Informáticos en ZOFRI S.A.</a:t>
+              <a:t>Manual de Buenas Prácticas para el Desarrollo de Proyectos Informáticos en ZOFRI S.A.</a:t>
             </a:r>
           </a:p>
         </p:txBody>

</xml_diff>